<commit_message>
PPT com entregáveis da Sprint 1
</commit_message>
<xml_diff>
--- a/Entregaveis_Sprint1.pptx
+++ b/Entregaveis_Sprint1.pptx
@@ -5326,7 +5326,7 @@
                 </a:solidFill>
                 <a:latin typeface="Exo 2" panose="00000500000000000000" pitchFamily="50" charset="0"/>
               </a:rPr>
-              <a:t> Stories 1</a:t>
+              <a:t> Stories #1</a:t>
             </a:r>
             <a:br>
               <a:rPr lang="pt-BR" dirty="0"/>
@@ -5459,7 +5459,16 @@
                 </a:solidFill>
                 <a:latin typeface="Exo 2" panose="00000500000000000000" pitchFamily="50" charset="0"/>
               </a:rPr>
-              <a:t> Stories 2</a:t>
+              <a:t> </a:t>
+            </a:r>
+            <a:r>
+              <a:rPr lang="pt-BR" sz="3600" b="1">
+                <a:solidFill>
+                  <a:srgbClr val="00B0F0"/>
+                </a:solidFill>
+                <a:latin typeface="Exo 2" panose="00000500000000000000" pitchFamily="50" charset="0"/>
+              </a:rPr>
+              <a:t>Stories #2</a:t>
             </a:r>
             <a:br>
               <a:rPr lang="pt-BR" dirty="0"/>
@@ -5764,7 +5773,25 @@
                 </a:solidFill>
                 <a:latin typeface="Exo 2" panose="00000500000000000000" pitchFamily="50" charset="0"/>
               </a:rPr>
-              <a:t> Stories 3</a:t>
+              <a:t> Stories </a:t>
+            </a:r>
+            <a:r>
+              <a:rPr lang="pt-BR" sz="3600" b="1" dirty="0">
+                <a:solidFill>
+                  <a:srgbClr val="00B0F0"/>
+                </a:solidFill>
+                <a:latin typeface="Exo 2" panose="00000500000000000000" pitchFamily="50" charset="0"/>
+              </a:rPr>
+              <a:t>#</a:t>
+            </a:r>
+            <a:r>
+              <a:rPr lang="pt-BR" sz="3300" b="1" dirty="0">
+                <a:solidFill>
+                  <a:srgbClr val="00B0F0"/>
+                </a:solidFill>
+                <a:latin typeface="Exo 2" panose="00000500000000000000" pitchFamily="50" charset="0"/>
+              </a:rPr>
+              <a:t>3</a:t>
             </a:r>
             <a:br>
               <a:rPr lang="pt-BR" dirty="0"/>
@@ -5897,7 +5924,25 @@
                 </a:solidFill>
                 <a:latin typeface="Exo 2" panose="00000500000000000000" pitchFamily="50" charset="0"/>
               </a:rPr>
-              <a:t> Stories 4</a:t>
+              <a:t> Stories </a:t>
+            </a:r>
+            <a:r>
+              <a:rPr lang="pt-BR" sz="3600" b="1" dirty="0">
+                <a:solidFill>
+                  <a:srgbClr val="00B0F0"/>
+                </a:solidFill>
+                <a:latin typeface="Exo 2" panose="00000500000000000000" pitchFamily="50" charset="0"/>
+              </a:rPr>
+              <a:t>#</a:t>
+            </a:r>
+            <a:r>
+              <a:rPr lang="pt-BR" sz="3300" b="1" dirty="0">
+                <a:solidFill>
+                  <a:srgbClr val="00B0F0"/>
+                </a:solidFill>
+                <a:latin typeface="Exo 2" panose="00000500000000000000" pitchFamily="50" charset="0"/>
+              </a:rPr>
+              <a:t>4</a:t>
             </a:r>
             <a:br>
               <a:rPr lang="pt-BR" dirty="0"/>
@@ -6199,7 +6244,25 @@
                 </a:solidFill>
                 <a:latin typeface="Exo 2" panose="00000500000000000000" pitchFamily="50" charset="0"/>
               </a:rPr>
-              <a:t> Stories 5</a:t>
+              <a:t> Stories </a:t>
+            </a:r>
+            <a:r>
+              <a:rPr lang="pt-BR" sz="3600" b="1" dirty="0">
+                <a:solidFill>
+                  <a:srgbClr val="00B0F0"/>
+                </a:solidFill>
+                <a:latin typeface="Exo 2" panose="00000500000000000000" pitchFamily="50" charset="0"/>
+              </a:rPr>
+              <a:t>#</a:t>
+            </a:r>
+            <a:r>
+              <a:rPr lang="pt-BR" sz="3300" b="1" dirty="0">
+                <a:solidFill>
+                  <a:srgbClr val="00B0F0"/>
+                </a:solidFill>
+                <a:latin typeface="Exo 2" panose="00000500000000000000" pitchFamily="50" charset="0"/>
+              </a:rPr>
+              <a:t>5</a:t>
             </a:r>
             <a:br>
               <a:rPr lang="pt-BR" dirty="0"/>
@@ -6332,7 +6395,25 @@
                 </a:solidFill>
                 <a:latin typeface="Exo 2" panose="00000500000000000000" pitchFamily="50" charset="0"/>
               </a:rPr>
-              <a:t> Stories 6</a:t>
+              <a:t> Stories </a:t>
+            </a:r>
+            <a:r>
+              <a:rPr lang="pt-BR" sz="3600" b="1" dirty="0">
+                <a:solidFill>
+                  <a:srgbClr val="00B0F0"/>
+                </a:solidFill>
+                <a:latin typeface="Exo 2" panose="00000500000000000000" pitchFamily="50" charset="0"/>
+              </a:rPr>
+              <a:t>#</a:t>
+            </a:r>
+            <a:r>
+              <a:rPr lang="pt-BR" sz="3300" b="1" dirty="0">
+                <a:solidFill>
+                  <a:srgbClr val="00B0F0"/>
+                </a:solidFill>
+                <a:latin typeface="Exo 2" panose="00000500000000000000" pitchFamily="50" charset="0"/>
+              </a:rPr>
+              <a:t>6</a:t>
             </a:r>
             <a:br>
               <a:rPr lang="pt-BR" sz="3300" dirty="0"/>

</xml_diff>